<commit_message>
Lecture 18 slide updates
</commit_message>
<xml_diff>
--- a/Lectures/ppt/Lecture 18 Life history evolution.pptx
+++ b/Lectures/ppt/Lecture 18 Life history evolution.pptx
@@ -206,7 +206,7 @@
           <a:p>
             <a:fld id="{18D37D9B-A346-EB42-B215-BDA382D1A93D}" type="datetimeFigureOut">
               <a:rPr lang="en-US" smtClean="0"/>
-              <a:t>19-10-29</a:t>
+              <a:t>19-10-31</a:t>
             </a:fld>
             <a:endParaRPr lang="en-US"/>
           </a:p>
@@ -530,7 +530,19 @@
             </a:r>
             <a:r>
               <a:rPr lang="en-US" baseline="0" dirty="0" smtClean="0"/>
-              <a:t> 0.5x0.55 0.5^2*0.55 0.5^3*.55</a:t>
+              <a:t> 0.5x0.55 0.5^</a:t>
+            </a:r>
+            <a:r>
+              <a:rPr lang="en-US" baseline="0" dirty="0" smtClean="0"/>
+              <a:t>2x0.55 </a:t>
+            </a:r>
+            <a:r>
+              <a:rPr lang="en-US" baseline="0" dirty="0" smtClean="0"/>
+              <a:t>0.5^</a:t>
+            </a:r>
+            <a:r>
+              <a:rPr lang="en-US" baseline="0" dirty="0" smtClean="0"/>
+              <a:t>3x0.55</a:t>
             </a:r>
             <a:r>
               <a:rPr lang="en-US" dirty="0" smtClean="0"/>
@@ -550,8 +562,19 @@
           <a:p>
             <a:r>
               <a:rPr lang="en-US" baseline="0" dirty="0" smtClean="0"/>
-              <a:t>Alpha = 5</a:t>
-            </a:r>
+              <a:t>Alpha = </a:t>
+            </a:r>
+            <a:r>
+              <a:rPr lang="en-US" baseline="0" dirty="0" smtClean="0"/>
+              <a:t>5</a:t>
+            </a:r>
+          </a:p>
+          <a:p>
+            <a:r>
+              <a:rPr lang="en-US" baseline="0" dirty="0" smtClean="0"/>
+              <a:t>R0 = .55x50+0.5x0.55x40 + 0.5^2x0.55x30 + 0.5^3x0.55x20 = 44</a:t>
+            </a:r>
+            <a:endParaRPr lang="en-US" baseline="0" dirty="0" smtClean="0"/>
           </a:p>
           <a:p>
             <a:endParaRPr lang="en-US" baseline="0" dirty="0" smtClean="0"/>
@@ -565,7 +588,15 @@
           <a:p>
             <a:r>
               <a:rPr lang="en-US" baseline="0" dirty="0" smtClean="0"/>
-              <a:t>L = [? 0.35 0.35*.5 0.35*.5^2]</a:t>
+              <a:t>L = [? 0.35 </a:t>
+            </a:r>
+            <a:r>
+              <a:rPr lang="en-US" baseline="0" dirty="0" smtClean="0"/>
+              <a:t>0.35x0.5 0.35x0.5</a:t>
+            </a:r>
+            <a:r>
+              <a:rPr lang="en-US" baseline="0" dirty="0" smtClean="0"/>
+              <a:t>^2]</a:t>
             </a:r>
           </a:p>
           <a:p>
@@ -577,7 +608,17 @@
           <a:p>
             <a:r>
               <a:rPr lang="en-US" baseline="0" dirty="0" smtClean="0"/>
-              <a:t>Alpha = 10</a:t>
+              <a:t>Alpha = </a:t>
+            </a:r>
+            <a:r>
+              <a:rPr lang="en-US" baseline="0" dirty="0" smtClean="0"/>
+              <a:t>10</a:t>
+            </a:r>
+          </a:p>
+          <a:p>
+            <a:r>
+              <a:rPr lang="en-US" baseline="0" dirty="0" smtClean="0"/>
+              <a:t>R0 = .35x80 + 0.35x0.5x50 + 0.35x0.5^2x40 = 40.25</a:t>
             </a:r>
             <a:endParaRPr lang="en-US" dirty="0"/>
           </a:p>
@@ -800,7 +841,7 @@
           <a:p>
             <a:fld id="{C3AC72EB-E400-3847-82AB-6BDE4A153418}" type="datetimeFigureOut">
               <a:rPr lang="en-US" smtClean="0"/>
-              <a:t>19-10-29</a:t>
+              <a:t>19-10-31</a:t>
             </a:fld>
             <a:endParaRPr lang="en-US"/>
           </a:p>
@@ -970,7 +1011,7 @@
           <a:p>
             <a:fld id="{C3AC72EB-E400-3847-82AB-6BDE4A153418}" type="datetimeFigureOut">
               <a:rPr lang="en-US" smtClean="0"/>
-              <a:t>19-10-29</a:t>
+              <a:t>19-10-31</a:t>
             </a:fld>
             <a:endParaRPr lang="en-US"/>
           </a:p>
@@ -1150,7 +1191,7 @@
           <a:p>
             <a:fld id="{C3AC72EB-E400-3847-82AB-6BDE4A153418}" type="datetimeFigureOut">
               <a:rPr lang="en-US" smtClean="0"/>
-              <a:t>19-10-29</a:t>
+              <a:t>19-10-31</a:t>
             </a:fld>
             <a:endParaRPr lang="en-US"/>
           </a:p>
@@ -1320,7 +1361,7 @@
           <a:p>
             <a:fld id="{C3AC72EB-E400-3847-82AB-6BDE4A153418}" type="datetimeFigureOut">
               <a:rPr lang="en-US" smtClean="0"/>
-              <a:t>19-10-29</a:t>
+              <a:t>19-10-31</a:t>
             </a:fld>
             <a:endParaRPr lang="en-US"/>
           </a:p>
@@ -1566,7 +1607,7 @@
           <a:p>
             <a:fld id="{C3AC72EB-E400-3847-82AB-6BDE4A153418}" type="datetimeFigureOut">
               <a:rPr lang="en-US" smtClean="0"/>
-              <a:t>19-10-29</a:t>
+              <a:t>19-10-31</a:t>
             </a:fld>
             <a:endParaRPr lang="en-US"/>
           </a:p>
@@ -1854,7 +1895,7 @@
           <a:p>
             <a:fld id="{C3AC72EB-E400-3847-82AB-6BDE4A153418}" type="datetimeFigureOut">
               <a:rPr lang="en-US" smtClean="0"/>
-              <a:t>19-10-29</a:t>
+              <a:t>19-10-31</a:t>
             </a:fld>
             <a:endParaRPr lang="en-US"/>
           </a:p>
@@ -2276,7 +2317,7 @@
           <a:p>
             <a:fld id="{C3AC72EB-E400-3847-82AB-6BDE4A153418}" type="datetimeFigureOut">
               <a:rPr lang="en-US" smtClean="0"/>
-              <a:t>19-10-29</a:t>
+              <a:t>19-10-31</a:t>
             </a:fld>
             <a:endParaRPr lang="en-US"/>
           </a:p>
@@ -2394,7 +2435,7 @@
           <a:p>
             <a:fld id="{C3AC72EB-E400-3847-82AB-6BDE4A153418}" type="datetimeFigureOut">
               <a:rPr lang="en-US" smtClean="0"/>
-              <a:t>19-10-29</a:t>
+              <a:t>19-10-31</a:t>
             </a:fld>
             <a:endParaRPr lang="en-US"/>
           </a:p>
@@ -2489,7 +2530,7 @@
           <a:p>
             <a:fld id="{C3AC72EB-E400-3847-82AB-6BDE4A153418}" type="datetimeFigureOut">
               <a:rPr lang="en-US" smtClean="0"/>
-              <a:t>19-10-29</a:t>
+              <a:t>19-10-31</a:t>
             </a:fld>
             <a:endParaRPr lang="en-US"/>
           </a:p>
@@ -2766,7 +2807,7 @@
           <a:p>
             <a:fld id="{C3AC72EB-E400-3847-82AB-6BDE4A153418}" type="datetimeFigureOut">
               <a:rPr lang="en-US" smtClean="0"/>
-              <a:t>19-10-29</a:t>
+              <a:t>19-10-31</a:t>
             </a:fld>
             <a:endParaRPr lang="en-US"/>
           </a:p>
@@ -3019,7 +3060,7 @@
           <a:p>
             <a:fld id="{C3AC72EB-E400-3847-82AB-6BDE4A153418}" type="datetimeFigureOut">
               <a:rPr lang="en-US" smtClean="0"/>
-              <a:t>19-10-29</a:t>
+              <a:t>19-10-31</a:t>
             </a:fld>
             <a:endParaRPr lang="en-US"/>
           </a:p>
@@ -3232,7 +3273,7 @@
           <a:p>
             <a:fld id="{C3AC72EB-E400-3847-82AB-6BDE4A153418}" type="datetimeFigureOut">
               <a:rPr lang="en-US" smtClean="0"/>
-              <a:t>19-10-29</a:t>
+              <a:t>19-10-31</a:t>
             </a:fld>
             <a:endParaRPr lang="en-US"/>
           </a:p>
@@ -3980,7 +4021,7 @@
           <a:graphicData uri="http://schemas.openxmlformats.org/presentationml/2006/ole">
             <mc:AlternateContent xmlns:mc="http://schemas.openxmlformats.org/markup-compatibility/2006">
               <mc:Choice xmlns:v="urn:schemas-microsoft-com:vml" Requires="v">
-                <p:oleObj spid="_x0000_s1037" name="Document" r:id="rId4" imgW="6299200" imgH="1727200" progId="Word.Document.12">
+                <p:oleObj spid="_x0000_s1050" name="Document" r:id="rId4" imgW="6299200" imgH="1727200" progId="Word.Document.12">
                   <p:embed/>
                 </p:oleObj>
               </mc:Choice>
@@ -4042,7 +4083,7 @@
           <a:graphicData uri="http://schemas.openxmlformats.org/presentationml/2006/ole">
             <mc:AlternateContent xmlns:mc="http://schemas.openxmlformats.org/markup-compatibility/2006">
               <mc:Choice xmlns:v="urn:schemas-microsoft-com:vml" Requires="v">
-                <p:oleObj spid="_x0000_s1038" name="Document" r:id="rId6" imgW="5854700" imgH="1727200" progId="Word.Document.12">
+                <p:oleObj spid="_x0000_s1051" name="Document" r:id="rId6" imgW="5854700" imgH="1727200" progId="Word.Document.12">
                   <p:embed/>
                 </p:oleObj>
               </mc:Choice>
@@ -4113,21 +4154,8 @@
                   <a:srgbClr val="000000"/>
                 </a:solidFill>
               </a:rPr>
-              <a:t>Exercise </a:t>
-            </a:r>
-            <a:r>
-              <a:rPr lang="en-US" sz="2600" b="1" u="sng" dirty="0" smtClean="0">
-                <a:solidFill>
-                  <a:srgbClr val="000000"/>
-                </a:solidFill>
-              </a:rPr>
-              <a:t>4</a:t>
-            </a:r>
-            <a:endParaRPr lang="en-US" sz="2600" b="1" u="sng" dirty="0" smtClean="0">
-              <a:solidFill>
-                <a:srgbClr val="000000"/>
-              </a:solidFill>
-            </a:endParaRPr>
+              <a:t>Exercise 4</a:t>
+            </a:r>
           </a:p>
           <a:p>
             <a:r>
@@ -4161,15 +4189,7 @@
                   <a:srgbClr val="000000"/>
                 </a:solidFill>
               </a:rPr>
-              <a:t>Calculate </a:t>
-            </a:r>
-            <a:r>
-              <a:rPr lang="en-US" sz="2600" dirty="0" smtClean="0">
-                <a:solidFill>
-                  <a:srgbClr val="000000"/>
-                </a:solidFill>
-              </a:rPr>
-              <a:t>R</a:t>
+              <a:t>Calculate R</a:t>
             </a:r>
             <a:r>
               <a:rPr lang="en-US" sz="2600" baseline="-25000" dirty="0" smtClean="0">
@@ -4185,49 +4205,17 @@
                   <a:srgbClr val="000000"/>
                 </a:solidFill>
               </a:rPr>
-              <a:t> for </a:t>
-            </a:r>
+              <a:t> for the large and small genotypes</a:t>
+            </a:r>
+          </a:p>
+          <a:p>
             <a:r>
               <a:rPr lang="en-US" sz="2600" dirty="0" smtClean="0">
                 <a:solidFill>
                   <a:srgbClr val="000000"/>
                 </a:solidFill>
               </a:rPr>
-              <a:t>the large and small</a:t>
-            </a:r>
-            <a:r>
-              <a:rPr lang="en-US" sz="2600" dirty="0" smtClean="0">
-                <a:solidFill>
-                  <a:srgbClr val="000000"/>
-                </a:solidFill>
-              </a:rPr>
-              <a:t> </a:t>
-            </a:r>
-            <a:r>
-              <a:rPr lang="en-US" sz="2600" dirty="0" smtClean="0">
-                <a:solidFill>
-                  <a:srgbClr val="000000"/>
-                </a:solidFill>
-              </a:rPr>
-              <a:t>genotypes</a:t>
-            </a:r>
-          </a:p>
-          <a:p>
-            <a:r>
-              <a:rPr lang="en-US" sz="2600" dirty="0" smtClean="0">
-                <a:solidFill>
-                  <a:srgbClr val="000000"/>
-                </a:solidFill>
-              </a:rPr>
-              <a:t>What type of life history tradeoff is represented by these life histories</a:t>
-            </a:r>
-            <a:r>
-              <a:rPr lang="en-US" sz="2600" dirty="0" smtClean="0">
-                <a:solidFill>
-                  <a:srgbClr val="000000"/>
-                </a:solidFill>
-              </a:rPr>
-              <a:t>?</a:t>
+              <a:t>What type of life history tradeoff is represented by these life histories?</a:t>
             </a:r>
             <a:endParaRPr lang="en-US" sz="2800" dirty="0">
               <a:solidFill>
@@ -4564,7 +4552,7 @@
           <a:graphicData uri="http://schemas.openxmlformats.org/presentationml/2006/ole">
             <mc:AlternateContent xmlns:mc="http://schemas.openxmlformats.org/markup-compatibility/2006">
               <mc:Choice xmlns:v="urn:schemas-microsoft-com:vml" Requires="v">
-                <p:oleObj spid="_x0000_s8412" name="Document" r:id="rId3" imgW="5486400" imgH="1168400" progId="Word.Document.12">
+                <p:oleObj spid="_x0000_s8425" name="Document" r:id="rId3" imgW="5486400" imgH="1168400" progId="Word.Document.12">
                   <p:embed/>
                 </p:oleObj>
               </mc:Choice>
@@ -4658,7 +4646,7 @@
           <a:graphicData uri="http://schemas.openxmlformats.org/presentationml/2006/ole">
             <mc:AlternateContent xmlns:mc="http://schemas.openxmlformats.org/markup-compatibility/2006">
               <mc:Choice xmlns:v="urn:schemas-microsoft-com:vml" Requires="v">
-                <p:oleObj spid="_x0000_s8413" name="Document" r:id="rId5" imgW="5486400" imgH="1435100" progId="Word.Document.12">
+                <p:oleObj spid="_x0000_s8426" name="Document" r:id="rId5" imgW="5486400" imgH="1435100" progId="Word.Document.12">
                   <p:embed/>
                 </p:oleObj>
               </mc:Choice>
@@ -5030,7 +5018,7 @@
           <a:graphicData uri="http://schemas.openxmlformats.org/presentationml/2006/ole">
             <mc:AlternateContent xmlns:mc="http://schemas.openxmlformats.org/markup-compatibility/2006">
               <mc:Choice xmlns:v="urn:schemas-microsoft-com:vml" Requires="v">
-                <p:oleObj spid="_x0000_s30847" name="Document" r:id="rId3" imgW="6299200" imgH="1727200" progId="Word.Document.12">
+                <p:oleObj spid="_x0000_s30860" name="Document" r:id="rId3" imgW="6299200" imgH="1727200" progId="Word.Document.12">
                   <p:embed/>
                 </p:oleObj>
               </mc:Choice>
@@ -5092,7 +5080,7 @@
           <a:graphicData uri="http://schemas.openxmlformats.org/presentationml/2006/ole">
             <mc:AlternateContent xmlns:mc="http://schemas.openxmlformats.org/markup-compatibility/2006">
               <mc:Choice xmlns:v="urn:schemas-microsoft-com:vml" Requires="v">
-                <p:oleObj spid="_x0000_s30848" name="Document" r:id="rId5" imgW="5854700" imgH="1727200" progId="Word.Document.12">
+                <p:oleObj spid="_x0000_s30861" name="Document" r:id="rId5" imgW="5854700" imgH="1727200" progId="Word.Document.12">
                   <p:embed/>
                 </p:oleObj>
               </mc:Choice>
@@ -5191,7 +5179,7 @@
           <a:graphicData uri="http://schemas.openxmlformats.org/presentationml/2006/ole">
             <mc:AlternateContent xmlns:mc="http://schemas.openxmlformats.org/markup-compatibility/2006">
               <mc:Choice xmlns:v="urn:schemas-microsoft-com:vml" Requires="v">
-                <p:oleObj spid="_x0000_s38989" name="Document" r:id="rId3" imgW="6299200" imgH="1727200" progId="Word.Document.12">
+                <p:oleObj spid="_x0000_s39002" name="Document" r:id="rId3" imgW="6299200" imgH="1727200" progId="Word.Document.12">
                   <p:embed/>
                 </p:oleObj>
               </mc:Choice>
@@ -5253,7 +5241,7 @@
           <a:graphicData uri="http://schemas.openxmlformats.org/presentationml/2006/ole">
             <mc:AlternateContent xmlns:mc="http://schemas.openxmlformats.org/markup-compatibility/2006">
               <mc:Choice xmlns:v="urn:schemas-microsoft-com:vml" Requires="v">
-                <p:oleObj spid="_x0000_s38990" name="Document" r:id="rId5" imgW="5854700" imgH="1727200" progId="Word.Document.12">
+                <p:oleObj spid="_x0000_s39003" name="Document" r:id="rId5" imgW="5854700" imgH="1727200" progId="Word.Document.12">
                   <p:embed/>
                 </p:oleObj>
               </mc:Choice>
@@ -5582,7 +5570,7 @@
           <p:nvPr>
             <p:extLst>
               <p:ext uri="{D42A27DB-BD31-4B8C-83A1-F6EECF244321}">
-                <p14:modId xmlns:p14="http://schemas.microsoft.com/office/powerpoint/2010/main" val="1347752995"/>
+                <p14:modId xmlns:p14="http://schemas.microsoft.com/office/powerpoint/2010/main" val="817950481"/>
               </p:ext>
             </p:extLst>
           </p:nvPr>
@@ -5595,7 +5583,7 @@
           <a:graphicData uri="http://schemas.openxmlformats.org/presentationml/2006/ole">
             <mc:AlternateContent xmlns:mc="http://schemas.openxmlformats.org/markup-compatibility/2006">
               <mc:Choice xmlns:v="urn:schemas-microsoft-com:vml" Requires="v">
-                <p:oleObj spid="_x0000_s37971" name="Document" r:id="rId3" imgW="6299200" imgH="1727200" progId="Word.Document.12">
+                <p:oleObj spid="_x0000_s37984" name="Document" r:id="rId3" imgW="6299200" imgH="1727200" progId="Word.Document.12">
                   <p:embed/>
                 </p:oleObj>
               </mc:Choice>
@@ -5644,7 +5632,7 @@
           <p:nvPr>
             <p:extLst>
               <p:ext uri="{D42A27DB-BD31-4B8C-83A1-F6EECF244321}">
-                <p14:modId xmlns:p14="http://schemas.microsoft.com/office/powerpoint/2010/main" val="232516951"/>
+                <p14:modId xmlns:p14="http://schemas.microsoft.com/office/powerpoint/2010/main" val="140752034"/>
               </p:ext>
             </p:extLst>
           </p:nvPr>
@@ -5657,7 +5645,7 @@
           <a:graphicData uri="http://schemas.openxmlformats.org/presentationml/2006/ole">
             <mc:AlternateContent xmlns:mc="http://schemas.openxmlformats.org/markup-compatibility/2006">
               <mc:Choice xmlns:v="urn:schemas-microsoft-com:vml" Requires="v">
-                <p:oleObj spid="_x0000_s37972" name="Document" r:id="rId5" imgW="5854700" imgH="1727200" progId="Word.Document.12">
+                <p:oleObj spid="_x0000_s37985" name="Document" r:id="rId5" imgW="5854700" imgH="1727200" progId="Word.Document.12">
                   <p:embed/>
                 </p:oleObj>
               </mc:Choice>

</xml_diff>